<commit_message>
Modify img link - Go lang으로 네트워크 프로그래밍
</commit_message>
<xml_diff>
--- a/Article/GO/Golang으로_네트워크_프로그래밍하기/img/img.pptx
+++ b/Article/GO/Golang으로_네트워크_프로그래밍하기/img/img.pptx
@@ -3374,7 +3374,7 @@
         </p:blipFill>
         <p:spPr bwMode="auto">
           <a:xfrm>
-            <a:off x="2921575" y="1374710"/>
+            <a:off x="3080195" y="1554241"/>
             <a:ext cx="3810000" cy="3810000"/>
           </a:xfrm>
           <a:prstGeom prst="rect">
@@ -3420,7 +3420,7 @@
         </p:blipFill>
         <p:spPr>
           <a:xfrm>
-            <a:off x="6385007" y="1996636"/>
+            <a:off x="6543627" y="2176167"/>
             <a:ext cx="1840146" cy="2505666"/>
           </a:xfrm>
           <a:prstGeom prst="rect">

</xml_diff>